<commit_message>
massive updates to 5,6,7
</commit_message>
<xml_diff>
--- a/labmanual/cover-page.pptx
+++ b/labmanual/cover-page.pptx
@@ -6,6 +6,7 @@
   </p:sldMasterIdLst>
   <p:sldIdLst>
     <p:sldId id="256" r:id="rId2"/>
+    <p:sldId id="257" r:id="rId3"/>
   </p:sldIdLst>
   <p:sldSz cx="6858000" cy="9144000" type="letter"/>
   <p:notesSz cx="6858000" cy="9144000"/>
@@ -104,6 +105,11 @@
       </a:defRPr>
     </a:lvl9pPr>
   </p:defaultTextStyle>
+  <p:extLst>
+    <p:ext uri="{EFAFB233-063F-42B5-8137-9DF3F51BA10A}">
+      <p15:sldGuideLst xmlns:p15="http://schemas.microsoft.com/office/powerpoint/2012/main"/>
+    </p:ext>
+  </p:extLst>
 </p:presentation>
 </file>
 
@@ -238,7 +244,7 @@
           <a:p>
             <a:fld id="{FD9117CB-CD87-A145-B0DD-B1FF23D56DC0}" type="datetimeFigureOut">
               <a:rPr lang="en-US" smtClean="0"/>
-              <a:t>10/21/16</a:t>
+              <a:t>10/22/16</a:t>
             </a:fld>
             <a:endParaRPr lang="en-US"/>
           </a:p>
@@ -408,7 +414,7 @@
           <a:p>
             <a:fld id="{FD9117CB-CD87-A145-B0DD-B1FF23D56DC0}" type="datetimeFigureOut">
               <a:rPr lang="en-US" smtClean="0"/>
-              <a:t>10/21/16</a:t>
+              <a:t>10/22/16</a:t>
             </a:fld>
             <a:endParaRPr lang="en-US"/>
           </a:p>
@@ -588,7 +594,7 @@
           <a:p>
             <a:fld id="{FD9117CB-CD87-A145-B0DD-B1FF23D56DC0}" type="datetimeFigureOut">
               <a:rPr lang="en-US" smtClean="0"/>
-              <a:t>10/21/16</a:t>
+              <a:t>10/22/16</a:t>
             </a:fld>
             <a:endParaRPr lang="en-US"/>
           </a:p>
@@ -758,7 +764,7 @@
           <a:p>
             <a:fld id="{FD9117CB-CD87-A145-B0DD-B1FF23D56DC0}" type="datetimeFigureOut">
               <a:rPr lang="en-US" smtClean="0"/>
-              <a:t>10/21/16</a:t>
+              <a:t>10/22/16</a:t>
             </a:fld>
             <a:endParaRPr lang="en-US"/>
           </a:p>
@@ -1002,7 +1008,7 @@
           <a:p>
             <a:fld id="{FD9117CB-CD87-A145-B0DD-B1FF23D56DC0}" type="datetimeFigureOut">
               <a:rPr lang="en-US" smtClean="0"/>
-              <a:t>10/21/16</a:t>
+              <a:t>10/22/16</a:t>
             </a:fld>
             <a:endParaRPr lang="en-US"/>
           </a:p>
@@ -1234,7 +1240,7 @@
           <a:p>
             <a:fld id="{FD9117CB-CD87-A145-B0DD-B1FF23D56DC0}" type="datetimeFigureOut">
               <a:rPr lang="en-US" smtClean="0"/>
-              <a:t>10/21/16</a:t>
+              <a:t>10/22/16</a:t>
             </a:fld>
             <a:endParaRPr lang="en-US"/>
           </a:p>
@@ -1601,7 +1607,7 @@
           <a:p>
             <a:fld id="{FD9117CB-CD87-A145-B0DD-B1FF23D56DC0}" type="datetimeFigureOut">
               <a:rPr lang="en-US" smtClean="0"/>
-              <a:t>10/21/16</a:t>
+              <a:t>10/22/16</a:t>
             </a:fld>
             <a:endParaRPr lang="en-US"/>
           </a:p>
@@ -1719,7 +1725,7 @@
           <a:p>
             <a:fld id="{FD9117CB-CD87-A145-B0DD-B1FF23D56DC0}" type="datetimeFigureOut">
               <a:rPr lang="en-US" smtClean="0"/>
-              <a:t>10/21/16</a:t>
+              <a:t>10/22/16</a:t>
             </a:fld>
             <a:endParaRPr lang="en-US"/>
           </a:p>
@@ -1814,7 +1820,7 @@
           <a:p>
             <a:fld id="{FD9117CB-CD87-A145-B0DD-B1FF23D56DC0}" type="datetimeFigureOut">
               <a:rPr lang="en-US" smtClean="0"/>
-              <a:t>10/21/16</a:t>
+              <a:t>10/22/16</a:t>
             </a:fld>
             <a:endParaRPr lang="en-US"/>
           </a:p>
@@ -2091,7 +2097,7 @@
           <a:p>
             <a:fld id="{FD9117CB-CD87-A145-B0DD-B1FF23D56DC0}" type="datetimeFigureOut">
               <a:rPr lang="en-US" smtClean="0"/>
-              <a:t>10/21/16</a:t>
+              <a:t>10/22/16</a:t>
             </a:fld>
             <a:endParaRPr lang="en-US"/>
           </a:p>
@@ -2348,7 +2354,7 @@
           <a:p>
             <a:fld id="{FD9117CB-CD87-A145-B0DD-B1FF23D56DC0}" type="datetimeFigureOut">
               <a:rPr lang="en-US" smtClean="0"/>
-              <a:t>10/21/16</a:t>
+              <a:t>10/22/16</a:t>
             </a:fld>
             <a:endParaRPr lang="en-US"/>
           </a:p>
@@ -2561,7 +2567,7 @@
           <a:p>
             <a:fld id="{FD9117CB-CD87-A145-B0DD-B1FF23D56DC0}" type="datetimeFigureOut">
               <a:rPr lang="en-US" smtClean="0"/>
-              <a:t>10/21/16</a:t>
+              <a:t>10/22/16</a:t>
             </a:fld>
             <a:endParaRPr lang="en-US"/>
           </a:p>
@@ -3094,6 +3100,136 @@
 </p:sld>
 </file>
 
+<file path=ppt/slides/slide2.xml><?xml version="1.0" encoding="utf-8"?>
+<p:sld xmlns:a="http://schemas.openxmlformats.org/drawingml/2006/main" xmlns:r="http://schemas.openxmlformats.org/officeDocument/2006/relationships" xmlns:p="http://schemas.openxmlformats.org/presentationml/2006/main">
+  <p:cSld>
+    <p:spTree>
+      <p:nvGrpSpPr>
+        <p:cNvPr id="1" name=""/>
+        <p:cNvGrpSpPr/>
+        <p:nvPr/>
+      </p:nvGrpSpPr>
+      <p:grpSpPr>
+        <a:xfrm>
+          <a:off x="0" y="0"/>
+          <a:ext cx="0" cy="0"/>
+          <a:chOff x="0" y="0"/>
+          <a:chExt cx="0" cy="0"/>
+        </a:xfrm>
+      </p:grpSpPr>
+      <p:sp>
+        <p:nvSpPr>
+          <p:cNvPr id="2" name="TextBox 1"/>
+          <p:cNvSpPr txBox="1"/>
+          <p:nvPr/>
+        </p:nvSpPr>
+        <p:spPr>
+          <a:xfrm>
+            <a:off x="1429510" y="1606164"/>
+            <a:ext cx="3998980" cy="369332"/>
+          </a:xfrm>
+          <a:prstGeom prst="rect">
+            <a:avLst/>
+          </a:prstGeom>
+          <a:noFill/>
+        </p:spPr>
+        <p:txBody>
+          <a:bodyPr wrap="none" rtlCol="0">
+            <a:spAutoFit/>
+          </a:bodyPr>
+          <a:lstStyle/>
+          <a:p>
+            <a:r>
+              <a:rPr lang="en-US" smtClean="0"/>
+              <a:t>WPA2 SSID = WA101WPA2 PW=KYNUM1</a:t>
+            </a:r>
+          </a:p>
+        </p:txBody>
+      </p:sp>
+      <p:sp>
+        <p:nvSpPr>
+          <p:cNvPr id="3" name="TextBox 2"/>
+          <p:cNvSpPr txBox="1"/>
+          <p:nvPr/>
+        </p:nvSpPr>
+        <p:spPr>
+          <a:xfrm>
+            <a:off x="1112693" y="3110286"/>
+            <a:ext cx="4632615" cy="369332"/>
+          </a:xfrm>
+          <a:prstGeom prst="rect">
+            <a:avLst/>
+          </a:prstGeom>
+          <a:noFill/>
+        </p:spPr>
+        <p:txBody>
+          <a:bodyPr wrap="none" rtlCol="0">
+            <a:spAutoFit/>
+          </a:bodyPr>
+          <a:lstStyle/>
+          <a:p>
+            <a:r>
+              <a:rPr lang="en-US" dirty="0" smtClean="0"/>
+              <a:t>Don</a:t>
+            </a:r>
+            <a:r>
+              <a:rPr lang="uk-UA" dirty="0" smtClean="0"/>
+              <a:t>’</a:t>
+            </a:r>
+            <a:r>
+              <a:rPr lang="en-US" dirty="0" smtClean="0"/>
+              <a:t>t forget to ctrl-s SAVE before you run Make</a:t>
+            </a:r>
+          </a:p>
+        </p:txBody>
+      </p:sp>
+      <p:sp>
+        <p:nvSpPr>
+          <p:cNvPr id="4" name="TextBox 3"/>
+          <p:cNvSpPr txBox="1"/>
+          <p:nvPr/>
+        </p:nvSpPr>
+        <p:spPr>
+          <a:xfrm>
+            <a:off x="1233527" y="2052762"/>
+            <a:ext cx="4390946" cy="369332"/>
+          </a:xfrm>
+          <a:prstGeom prst="rect">
+            <a:avLst/>
+          </a:prstGeom>
+          <a:noFill/>
+        </p:spPr>
+        <p:txBody>
+          <a:bodyPr wrap="none" rtlCol="0">
+            <a:spAutoFit/>
+          </a:bodyPr>
+          <a:lstStyle/>
+          <a:p>
+            <a:r>
+              <a:rPr lang="en-US" dirty="0" smtClean="0"/>
+              <a:t>waep.wa101.cypress.com IP Address = </a:t>
+            </a:r>
+            <a:r>
+              <a:rPr lang="en-US" dirty="0" err="1" smtClean="0"/>
+              <a:t>x.y.z.a</a:t>
+            </a:r>
+            <a:endParaRPr lang="en-US" dirty="0" smtClean="0"/>
+          </a:p>
+        </p:txBody>
+      </p:sp>
+    </p:spTree>
+    <p:extLst>
+      <p:ext uri="{BB962C8B-B14F-4D97-AF65-F5344CB8AC3E}">
+        <p14:creationId xmlns:p14="http://schemas.microsoft.com/office/powerpoint/2010/main" val="421480346"/>
+      </p:ext>
+    </p:extLst>
+  </p:cSld>
+  <p:clrMapOvr>
+    <a:masterClrMapping/>
+  </p:clrMapOvr>
+</p:sld>
+</file>
+
 <file path=ppt/theme/theme1.xml><?xml version="1.0" encoding="utf-8"?>
 <a:theme xmlns:a="http://schemas.openxmlformats.org/drawingml/2006/main" name="Office Theme">
   <a:themeElements>

</xml_diff>

<commit_message>
Updates prior to WW50 class. All projects and manuals modified for Wiced Studio 4.0 and other changes from pilot class.
</commit_message>
<xml_diff>
--- a/labmanual/cover-page.pptx
+++ b/labmanual/cover-page.pptx
@@ -244,7 +244,7 @@
           <a:p>
             <a:fld id="{FD9117CB-CD87-A145-B0DD-B1FF23D56DC0}" type="datetimeFigureOut">
               <a:rPr lang="en-US" smtClean="0"/>
-              <a:t>10/25/16</a:t>
+              <a:t>11/30/2016</a:t>
             </a:fld>
             <a:endParaRPr lang="en-US"/>
           </a:p>
@@ -414,7 +414,7 @@
           <a:p>
             <a:fld id="{FD9117CB-CD87-A145-B0DD-B1FF23D56DC0}" type="datetimeFigureOut">
               <a:rPr lang="en-US" smtClean="0"/>
-              <a:t>10/25/16</a:t>
+              <a:t>11/30/2016</a:t>
             </a:fld>
             <a:endParaRPr lang="en-US"/>
           </a:p>
@@ -594,7 +594,7 @@
           <a:p>
             <a:fld id="{FD9117CB-CD87-A145-B0DD-B1FF23D56DC0}" type="datetimeFigureOut">
               <a:rPr lang="en-US" smtClean="0"/>
-              <a:t>10/25/16</a:t>
+              <a:t>11/30/2016</a:t>
             </a:fld>
             <a:endParaRPr lang="en-US"/>
           </a:p>
@@ -764,7 +764,7 @@
           <a:p>
             <a:fld id="{FD9117CB-CD87-A145-B0DD-B1FF23D56DC0}" type="datetimeFigureOut">
               <a:rPr lang="en-US" smtClean="0"/>
-              <a:t>10/25/16</a:t>
+              <a:t>11/30/2016</a:t>
             </a:fld>
             <a:endParaRPr lang="en-US"/>
           </a:p>
@@ -1008,7 +1008,7 @@
           <a:p>
             <a:fld id="{FD9117CB-CD87-A145-B0DD-B1FF23D56DC0}" type="datetimeFigureOut">
               <a:rPr lang="en-US" smtClean="0"/>
-              <a:t>10/25/16</a:t>
+              <a:t>11/30/2016</a:t>
             </a:fld>
             <a:endParaRPr lang="en-US"/>
           </a:p>
@@ -1240,7 +1240,7 @@
           <a:p>
             <a:fld id="{FD9117CB-CD87-A145-B0DD-B1FF23D56DC0}" type="datetimeFigureOut">
               <a:rPr lang="en-US" smtClean="0"/>
-              <a:t>10/25/16</a:t>
+              <a:t>11/30/2016</a:t>
             </a:fld>
             <a:endParaRPr lang="en-US"/>
           </a:p>
@@ -1607,7 +1607,7 @@
           <a:p>
             <a:fld id="{FD9117CB-CD87-A145-B0DD-B1FF23D56DC0}" type="datetimeFigureOut">
               <a:rPr lang="en-US" smtClean="0"/>
-              <a:t>10/25/16</a:t>
+              <a:t>11/30/2016</a:t>
             </a:fld>
             <a:endParaRPr lang="en-US"/>
           </a:p>
@@ -1725,7 +1725,7 @@
           <a:p>
             <a:fld id="{FD9117CB-CD87-A145-B0DD-B1FF23D56DC0}" type="datetimeFigureOut">
               <a:rPr lang="en-US" smtClean="0"/>
-              <a:t>10/25/16</a:t>
+              <a:t>11/30/2016</a:t>
             </a:fld>
             <a:endParaRPr lang="en-US"/>
           </a:p>
@@ -1820,7 +1820,7 @@
           <a:p>
             <a:fld id="{FD9117CB-CD87-A145-B0DD-B1FF23D56DC0}" type="datetimeFigureOut">
               <a:rPr lang="en-US" smtClean="0"/>
-              <a:t>10/25/16</a:t>
+              <a:t>11/30/2016</a:t>
             </a:fld>
             <a:endParaRPr lang="en-US"/>
           </a:p>
@@ -2097,7 +2097,7 @@
           <a:p>
             <a:fld id="{FD9117CB-CD87-A145-B0DD-B1FF23D56DC0}" type="datetimeFigureOut">
               <a:rPr lang="en-US" smtClean="0"/>
-              <a:t>10/25/16</a:t>
+              <a:t>11/30/2016</a:t>
             </a:fld>
             <a:endParaRPr lang="en-US"/>
           </a:p>
@@ -2354,7 +2354,7 @@
           <a:p>
             <a:fld id="{FD9117CB-CD87-A145-B0DD-B1FF23D56DC0}" type="datetimeFigureOut">
               <a:rPr lang="en-US" smtClean="0"/>
-              <a:t>10/25/16</a:t>
+              <a:t>11/30/2016</a:t>
             </a:fld>
             <a:endParaRPr lang="en-US"/>
           </a:p>
@@ -2567,7 +2567,7 @@
           <a:p>
             <a:fld id="{FD9117CB-CD87-A145-B0DD-B1FF23D56DC0}" type="datetimeFigureOut">
               <a:rPr lang="en-US" smtClean="0"/>
-              <a:t>10/25/16</a:t>
+              <a:t>11/30/2016</a:t>
             </a:fld>
             <a:endParaRPr lang="en-US"/>
           </a:p>
@@ -3132,8 +3132,8 @@
         </p:nvSpPr>
         <p:spPr>
           <a:xfrm>
-            <a:off x="1573683" y="1939208"/>
-            <a:ext cx="3996479" cy="369332"/>
+            <a:off x="1532454" y="1939208"/>
+            <a:ext cx="4078937" cy="369332"/>
           </a:xfrm>
           <a:prstGeom prst="rect">
             <a:avLst/>
@@ -3152,15 +3152,15 @@
               <a:t>WPA2 SSID = </a:t>
             </a:r>
             <a:r>
-              <a:rPr lang="en-US" smtClean="0"/>
-              <a:t>WA101WPA </a:t>
-            </a:r>
-            <a:r>
-              <a:rPr lang="en-US" smtClean="0"/>
+              <a:rPr lang="en-US" dirty="0" smtClean="0"/>
+              <a:t>WW101WPA </a:t>
+            </a:r>
+            <a:r>
+              <a:rPr lang="en-US" dirty="0" smtClean="0"/>
               <a:t>PW=</a:t>
             </a:r>
             <a:r>
-              <a:rPr lang="en-US"/>
+              <a:rPr lang="en-US" dirty="0"/>
               <a:t>kywpa123</a:t>
             </a:r>
             <a:endParaRPr lang="en-US" dirty="0" smtClean="0"/>
@@ -3213,8 +3213,8 @@
         </p:nvSpPr>
         <p:spPr>
           <a:xfrm>
-            <a:off x="1041325" y="2424611"/>
-            <a:ext cx="5061194" cy="369332"/>
+            <a:off x="984451" y="2424611"/>
+            <a:ext cx="5174943" cy="369332"/>
           </a:xfrm>
           <a:prstGeom prst="rect">
             <a:avLst/>
@@ -3230,13 +3230,12 @@
             <a:pPr algn="ctr"/>
             <a:r>
               <a:rPr lang="en-US" dirty="0" smtClean="0"/>
-              <a:t>waep.wa101.cypress.com IP Address = </a:t>
+              <a:t>wwep.ww101.cypress.com </a:t>
             </a:r>
             <a:r>
               <a:rPr lang="en-US" dirty="0" smtClean="0"/>
-              <a:t>198.51.100.3</a:t>
-            </a:r>
-            <a:endParaRPr lang="en-US" dirty="0" smtClean="0"/>
+              <a:t>IP Address = 198.51.100.3</a:t>
+            </a:r>
           </a:p>
         </p:txBody>
       </p:sp>
@@ -3248,8 +3247,8 @@
         </p:nvSpPr>
         <p:spPr>
           <a:xfrm>
-            <a:off x="2264898" y="1137463"/>
-            <a:ext cx="2614049" cy="369332"/>
+            <a:off x="2223637" y="1137463"/>
+            <a:ext cx="2696572" cy="369332"/>
           </a:xfrm>
           <a:prstGeom prst="rect">
             <a:avLst/>
@@ -3264,24 +3263,12 @@
           <a:p>
             <a:pPr algn="ctr"/>
             <a:r>
-              <a:rPr lang="en-US" smtClean="0"/>
-              <a:t>OPEN</a:t>
-            </a:r>
-            <a:r>
-              <a:rPr lang="en-US" smtClean="0"/>
-              <a:t> </a:t>
-            </a:r>
-            <a:r>
               <a:rPr lang="en-US" dirty="0" smtClean="0"/>
-              <a:t>SSID </a:t>
-            </a:r>
-            <a:r>
-              <a:rPr lang="en-US" smtClean="0"/>
-              <a:t>= </a:t>
-            </a:r>
-            <a:r>
-              <a:rPr lang="en-US" smtClean="0"/>
-              <a:t>WA101OPEN</a:t>
+              <a:t>OPEN SSID = </a:t>
+            </a:r>
+            <a:r>
+              <a:rPr lang="en-US" dirty="0" smtClean="0"/>
+              <a:t>WW101OPEN</a:t>
             </a:r>
             <a:endParaRPr lang="en-US" dirty="0" smtClean="0"/>
           </a:p>
@@ -3295,8 +3282,8 @@
         </p:nvSpPr>
         <p:spPr>
           <a:xfrm>
-            <a:off x="1810222" y="1506795"/>
-            <a:ext cx="3523400" cy="369332"/>
+            <a:off x="1768960" y="1506795"/>
+            <a:ext cx="3605924" cy="369332"/>
           </a:xfrm>
           <a:prstGeom prst="rect">
             <a:avLst/>
@@ -3312,19 +3299,15 @@
             <a:pPr algn="ctr"/>
             <a:r>
               <a:rPr lang="en-US" dirty="0" smtClean="0"/>
-              <a:t>WEP </a:t>
+              <a:t>WEP SSID = </a:t>
             </a:r>
             <a:r>
               <a:rPr lang="en-US" dirty="0" smtClean="0"/>
-              <a:t>SSID </a:t>
+              <a:t>WW101WEP </a:t>
             </a:r>
             <a:r>
               <a:rPr lang="en-US" dirty="0" smtClean="0"/>
-              <a:t>= </a:t>
-            </a:r>
-            <a:r>
-              <a:rPr lang="en-US" dirty="0" smtClean="0"/>
-              <a:t>WA101WEP PW=</a:t>
+              <a:t>PW=</a:t>
             </a:r>
             <a:r>
               <a:rPr lang="en-US" dirty="0" err="1" smtClean="0"/>

</xml_diff>